<commit_message>
Added suggestions for next steps to undertake
Added remarks about UNC UCS, LinkedIn and personal page stuff.

Also added link to github/BarkleyBG/BSA_info
</commit_message>
<xml_diff>
--- a/BSA Internship Workshop 2016 Slides.pptx
+++ b/BSA Internship Workshop 2016 Slides.pptx
@@ -5,7 +5,7 @@
     <p:sldMasterId id="2147483648" r:id="rId1"/>
   </p:sldMasterIdLst>
   <p:notesMasterIdLst>
-    <p:notesMasterId r:id="rId43"/>
+    <p:notesMasterId r:id="rId42"/>
   </p:notesMasterIdLst>
   <p:sldIdLst>
     <p:sldId id="256" r:id="rId2"/>
@@ -39,16 +39,15 @@
     <p:sldId id="295" r:id="rId30"/>
     <p:sldId id="290" r:id="rId31"/>
     <p:sldId id="279" r:id="rId32"/>
-    <p:sldId id="293" r:id="rId33"/>
-    <p:sldId id="280" r:id="rId34"/>
-    <p:sldId id="292" r:id="rId35"/>
-    <p:sldId id="281" r:id="rId36"/>
-    <p:sldId id="282" r:id="rId37"/>
-    <p:sldId id="297" r:id="rId38"/>
-    <p:sldId id="283" r:id="rId39"/>
-    <p:sldId id="284" r:id="rId40"/>
-    <p:sldId id="285" r:id="rId41"/>
-    <p:sldId id="303" r:id="rId42"/>
+    <p:sldId id="280" r:id="rId33"/>
+    <p:sldId id="292" r:id="rId34"/>
+    <p:sldId id="281" r:id="rId35"/>
+    <p:sldId id="282" r:id="rId36"/>
+    <p:sldId id="297" r:id="rId37"/>
+    <p:sldId id="283" r:id="rId38"/>
+    <p:sldId id="284" r:id="rId39"/>
+    <p:sldId id="285" r:id="rId40"/>
+    <p:sldId id="303" r:id="rId41"/>
   </p:sldIdLst>
   <p:sldSz cx="9144000" cy="6858000" type="screen4x3"/>
   <p:notesSz cx="6858000" cy="9144000"/>
@@ -779,6 +778,98 @@
     <p:extLst>
       <p:ext uri="{BB962C8B-B14F-4D97-AF65-F5344CB8AC3E}">
         <p14:creationId xmlns:p14="http://schemas.microsoft.com/office/powerpoint/2010/main" val="4226736741"/>
+      </p:ext>
+    </p:extLst>
+  </p:cSld>
+  <p:clrMapOvr>
+    <a:masterClrMapping/>
+  </p:clrMapOvr>
+</p:notes>
+</file>
+
+<file path=ppt/notesSlides/notesSlide4.xml><?xml version="1.0" encoding="utf-8"?>
+<p:notes xmlns:a="http://schemas.openxmlformats.org/drawingml/2006/main" xmlns:r="http://schemas.openxmlformats.org/officeDocument/2006/relationships" xmlns:p="http://schemas.openxmlformats.org/presentationml/2006/main">
+  <p:cSld>
+    <p:spTree>
+      <p:nvGrpSpPr>
+        <p:cNvPr id="1" name=""/>
+        <p:cNvGrpSpPr/>
+        <p:nvPr/>
+      </p:nvGrpSpPr>
+      <p:grpSpPr>
+        <a:xfrm>
+          <a:off x="0" y="0"/>
+          <a:ext cx="0" cy="0"/>
+          <a:chOff x="0" y="0"/>
+          <a:chExt cx="0" cy="0"/>
+        </a:xfrm>
+      </p:grpSpPr>
+      <p:sp>
+        <p:nvSpPr>
+          <p:cNvPr id="2" name="Slide Image Placeholder 1"/>
+          <p:cNvSpPr>
+            <a:spLocks noGrp="1" noRot="1" noChangeAspect="1"/>
+          </p:cNvSpPr>
+          <p:nvPr>
+            <p:ph type="sldImg"/>
+          </p:nvPr>
+        </p:nvSpPr>
+        <p:spPr/>
+      </p:sp>
+      <p:sp>
+        <p:nvSpPr>
+          <p:cNvPr id="3" name="Notes Placeholder 2"/>
+          <p:cNvSpPr>
+            <a:spLocks noGrp="1"/>
+          </p:cNvSpPr>
+          <p:nvPr>
+            <p:ph type="body" idx="1"/>
+          </p:nvPr>
+        </p:nvSpPr>
+        <p:spPr/>
+        <p:txBody>
+          <a:bodyPr/>
+          <a:lstStyle/>
+          <a:p>
+            <a:r>
+              <a:rPr lang="en-US" dirty="0" smtClean="0"/>
+              <a:t>Mention</a:t>
+            </a:r>
+            <a:r>
+              <a:rPr lang="en-US" baseline="0" dirty="0" smtClean="0"/>
+              <a:t> that lots of </a:t>
+            </a:r>
+            <a:endParaRPr lang="en-US" dirty="0"/>
+          </a:p>
+        </p:txBody>
+      </p:sp>
+      <p:sp>
+        <p:nvSpPr>
+          <p:cNvPr id="4" name="Slide Number Placeholder 3"/>
+          <p:cNvSpPr>
+            <a:spLocks noGrp="1"/>
+          </p:cNvSpPr>
+          <p:nvPr>
+            <p:ph type="sldNum" sz="quarter" idx="10"/>
+          </p:nvPr>
+        </p:nvSpPr>
+        <p:spPr/>
+        <p:txBody>
+          <a:bodyPr/>
+          <a:lstStyle/>
+          <a:p>
+            <a:fld id="{85233F3A-B2E7-48C2-9F1C-FFCB2EB89E09}" type="slidenum">
+              <a:rPr lang="en-US" smtClean="0"/>
+              <a:t>8</a:t>
+            </a:fld>
+            <a:endParaRPr lang="en-US"/>
+          </a:p>
+        </p:txBody>
+      </p:sp>
+    </p:spTree>
+    <p:extLst>
+      <p:ext uri="{BB962C8B-B14F-4D97-AF65-F5344CB8AC3E}">
+        <p14:creationId xmlns:p14="http://schemas.microsoft.com/office/powerpoint/2010/main" val="2120436838"/>
       </p:ext>
     </p:extLst>
   </p:cSld>
@@ -3843,13 +3934,24 @@
             <p:ph type="subTitle" idx="1"/>
           </p:nvPr>
         </p:nvSpPr>
-        <p:spPr/>
-        <p:txBody>
-          <a:bodyPr/>
-          <a:lstStyle/>
-          <a:p>
-            <a:r>
-              <a:rPr lang="en-US" dirty="0" smtClean="0"/>
+        <p:spPr>
+          <a:xfrm>
+            <a:off x="838200" y="3886200"/>
+            <a:ext cx="7620000" cy="2743200"/>
+          </a:xfrm>
+        </p:spPr>
+        <p:txBody>
+          <a:bodyPr>
+            <a:normAutofit fontScale="92500" lnSpcReduction="20000"/>
+          </a:bodyPr>
+          <a:lstStyle/>
+          <a:p>
+            <a:r>
+              <a:rPr lang="en-US" dirty="0" smtClean="0">
+                <a:solidFill>
+                  <a:schemeClr val="tx1"/>
+                </a:solidFill>
+              </a:rPr>
               <a:t>12/5/2016</a:t>
             </a:r>
           </a:p>
@@ -3858,9 +3960,41 @@
           </a:p>
           <a:p>
             <a:r>
-              <a:rPr lang="en-US" dirty="0" smtClean="0"/>
-              <a:t>Brian Barkley, Yue Jiang</a:t>
-            </a:r>
+              <a:rPr lang="en-US" dirty="0" smtClean="0">
+                <a:solidFill>
+                  <a:schemeClr val="tx1"/>
+                </a:solidFill>
+              </a:rPr>
+              <a:t>Brian Barkley, Yue </a:t>
+            </a:r>
+            <a:r>
+              <a:rPr lang="en-US" dirty="0" smtClean="0">
+                <a:solidFill>
+                  <a:schemeClr val="tx1"/>
+                </a:solidFill>
+              </a:rPr>
+              <a:t>Jiang</a:t>
+            </a:r>
+          </a:p>
+          <a:p>
+            <a:endParaRPr lang="en-US" dirty="0"/>
+          </a:p>
+          <a:p>
+            <a:r>
+              <a:rPr lang="en-US" dirty="0" smtClean="0"/>
+              <a:t>Slides available for download at: </a:t>
+            </a:r>
+            <a:r>
+              <a:rPr lang="en-US" dirty="0" smtClean="0">
+                <a:hlinkClick r:id="rId2"/>
+              </a:rPr>
+              <a:t>https://github.com/BarkleyBG/BSA_info</a:t>
+            </a:r>
+            <a:r>
+              <a:rPr lang="en-US" dirty="0" smtClean="0"/>
+              <a:t> </a:t>
+            </a:r>
+            <a:endParaRPr lang="en-US" dirty="0" smtClean="0"/>
           </a:p>
           <a:p>
             <a:endParaRPr lang="en-US" dirty="0"/>
@@ -8413,8 +8547,27 @@
             <a:pPr lvl="1"/>
             <a:r>
               <a:rPr lang="en-US" dirty="0" smtClean="0"/>
-              <a:t>What did you write about?</a:t>
-            </a:r>
+              <a:t>In your writing, how did you discuss UNC?</a:t>
+            </a:r>
+          </a:p>
+          <a:p>
+            <a:pPr lvl="2"/>
+            <a:r>
+              <a:rPr lang="en-US" dirty="0" smtClean="0"/>
+              <a:t>What did you say interested you about UNC?</a:t>
+            </a:r>
+          </a:p>
+          <a:p>
+            <a:pPr lvl="2"/>
+            <a:r>
+              <a:rPr lang="en-US" dirty="0" smtClean="0"/>
+              <a:t>Did you mention any centers or research groups by name?</a:t>
+            </a:r>
+            <a:endParaRPr lang="en-US" dirty="0" smtClean="0"/>
+          </a:p>
+          <a:p>
+            <a:pPr lvl="3"/>
+            <a:endParaRPr lang="en-US" dirty="0" smtClean="0"/>
           </a:p>
           <a:p>
             <a:pPr lvl="1"/>
@@ -8433,7 +8586,7 @@
     </p:spTree>
     <p:extLst>
       <p:ext uri="{BB962C8B-B14F-4D97-AF65-F5344CB8AC3E}">
-        <p14:creationId xmlns:p14="http://schemas.microsoft.com/office/powerpoint/2010/main" val="3223655463"/>
+        <p14:creationId xmlns:p14="http://schemas.microsoft.com/office/powerpoint/2010/main" val="2732068919"/>
       </p:ext>
     </p:extLst>
   </p:cSld>
@@ -8530,23 +8683,58 @@
             <a:pPr lvl="1"/>
             <a:r>
               <a:rPr lang="en-US" dirty="0" smtClean="0"/>
-              <a:t>In your writing, how did you discuss UNC?</a:t>
+              <a:t>Knowing </a:t>
+            </a:r>
+            <a:r>
+              <a:rPr lang="en-US" dirty="0" smtClean="0"/>
+              <a:t>what you know now about UNC, what would you write about?</a:t>
             </a:r>
           </a:p>
           <a:p>
             <a:pPr lvl="2"/>
             <a:r>
               <a:rPr lang="en-US" dirty="0" smtClean="0"/>
-              <a:t>What did you say interested you about UNC?</a:t>
+              <a:t>CSCC? </a:t>
             </a:r>
           </a:p>
           <a:p>
             <a:pPr lvl="2"/>
             <a:r>
-              <a:rPr lang="en-US" dirty="0" smtClean="0"/>
-              <a:t>Did you mention any centers or research groups by name?</a:t>
-            </a:r>
-            <a:endParaRPr lang="en-US" dirty="0" smtClean="0"/>
+              <a:rPr lang="en-US" dirty="0" err="1" smtClean="0"/>
+              <a:t>NCTracs</a:t>
+            </a:r>
+            <a:r>
+              <a:rPr lang="en-US" dirty="0" smtClean="0"/>
+              <a:t>?</a:t>
+            </a:r>
+          </a:p>
+          <a:p>
+            <a:pPr lvl="2"/>
+            <a:r>
+              <a:rPr lang="en-US" dirty="0" smtClean="0"/>
+              <a:t>SMART trials? </a:t>
+            </a:r>
+          </a:p>
+          <a:p>
+            <a:pPr lvl="2"/>
+            <a:r>
+              <a:rPr lang="en-US" dirty="0" smtClean="0"/>
+              <a:t>Ties to Pharma and Rho and Quintiles? </a:t>
+            </a:r>
+          </a:p>
+          <a:p>
+            <a:pPr lvl="2"/>
+            <a:r>
+              <a:rPr lang="en-US" dirty="0" smtClean="0"/>
+              <a:t>Long tradition and history?</a:t>
+            </a:r>
+          </a:p>
+          <a:p>
+            <a:pPr lvl="3"/>
+            <a:r>
+              <a:rPr lang="en-US" sz="2400" dirty="0" smtClean="0"/>
+              <a:t>These are all available online, no?</a:t>
+            </a:r>
           </a:p>
           <a:p>
             <a:pPr lvl="3"/>
@@ -8569,7 +8757,7 @@
     </p:spTree>
     <p:extLst>
       <p:ext uri="{BB962C8B-B14F-4D97-AF65-F5344CB8AC3E}">
-        <p14:creationId xmlns:p14="http://schemas.microsoft.com/office/powerpoint/2010/main" val="2732068919"/>
+        <p14:creationId xmlns:p14="http://schemas.microsoft.com/office/powerpoint/2010/main" val="386448841"/>
       </p:ext>
     </p:extLst>
   </p:cSld>
@@ -8615,187 +8803,6 @@
         </p:nvSpPr>
         <p:spPr/>
         <p:txBody>
-          <a:bodyPr>
-            <a:normAutofit fontScale="90000"/>
-          </a:bodyPr>
-          <a:lstStyle/>
-          <a:p>
-            <a:r>
-              <a:rPr lang="en-US" dirty="0"/>
-              <a:t>Small group BREAKOUT – 5 minutes</a:t>
-            </a:r>
-          </a:p>
-        </p:txBody>
-      </p:sp>
-      <p:sp>
-        <p:nvSpPr>
-          <p:cNvPr id="3" name="Content Placeholder 2"/>
-          <p:cNvSpPr>
-            <a:spLocks noGrp="1"/>
-          </p:cNvSpPr>
-          <p:nvPr>
-            <p:ph idx="1"/>
-          </p:nvPr>
-        </p:nvSpPr>
-        <p:spPr>
-          <a:xfrm>
-            <a:off x="76200" y="1295400"/>
-            <a:ext cx="8839200" cy="5638800"/>
-          </a:xfrm>
-        </p:spPr>
-        <p:txBody>
-          <a:bodyPr>
-            <a:normAutofit/>
-          </a:bodyPr>
-          <a:lstStyle/>
-          <a:p>
-            <a:r>
-              <a:rPr lang="en-US" dirty="0" smtClean="0"/>
-              <a:t>Get </a:t>
-            </a:r>
-            <a:r>
-              <a:rPr lang="en-US" dirty="0"/>
-              <a:t>out your personal statement for your UNC BIOS applications</a:t>
-            </a:r>
-            <a:r>
-              <a:rPr lang="en-US" dirty="0" smtClean="0"/>
-              <a:t>!</a:t>
-            </a:r>
-          </a:p>
-          <a:p>
-            <a:pPr lvl="1"/>
-            <a:r>
-              <a:rPr lang="en-US" dirty="0" smtClean="0"/>
-              <a:t>What did you write about?</a:t>
-            </a:r>
-          </a:p>
-          <a:p>
-            <a:pPr lvl="2"/>
-            <a:r>
-              <a:rPr lang="en-US" dirty="0"/>
-              <a:t>(are you doing that now? It’s okay if you’re not!)</a:t>
-            </a:r>
-          </a:p>
-          <a:p>
-            <a:pPr lvl="1"/>
-            <a:r>
-              <a:rPr lang="en-US" dirty="0" smtClean="0"/>
-              <a:t>Knowing what you know now about UNC, what would you write about?</a:t>
-            </a:r>
-          </a:p>
-          <a:p>
-            <a:pPr lvl="2"/>
-            <a:r>
-              <a:rPr lang="en-US" dirty="0" smtClean="0"/>
-              <a:t>CSCC? </a:t>
-            </a:r>
-          </a:p>
-          <a:p>
-            <a:pPr lvl="2"/>
-            <a:r>
-              <a:rPr lang="en-US" dirty="0" err="1" smtClean="0"/>
-              <a:t>NCTracs</a:t>
-            </a:r>
-            <a:r>
-              <a:rPr lang="en-US" dirty="0" smtClean="0"/>
-              <a:t>?</a:t>
-            </a:r>
-          </a:p>
-          <a:p>
-            <a:pPr lvl="2"/>
-            <a:r>
-              <a:rPr lang="en-US" dirty="0" smtClean="0"/>
-              <a:t>SMART trials? </a:t>
-            </a:r>
-          </a:p>
-          <a:p>
-            <a:pPr lvl="2"/>
-            <a:r>
-              <a:rPr lang="en-US" dirty="0" smtClean="0"/>
-              <a:t>Ties to Pharma and Rho and Quintiles? </a:t>
-            </a:r>
-          </a:p>
-          <a:p>
-            <a:pPr lvl="2"/>
-            <a:r>
-              <a:rPr lang="en-US" dirty="0" smtClean="0"/>
-              <a:t>Long tradition and history?</a:t>
-            </a:r>
-          </a:p>
-          <a:p>
-            <a:pPr lvl="3"/>
-            <a:r>
-              <a:rPr lang="en-US" sz="2400" dirty="0" smtClean="0"/>
-              <a:t>These are all available online, no?</a:t>
-            </a:r>
-          </a:p>
-          <a:p>
-            <a:pPr lvl="3"/>
-            <a:endParaRPr lang="en-US" dirty="0" smtClean="0"/>
-          </a:p>
-          <a:p>
-            <a:pPr lvl="1"/>
-            <a:endParaRPr lang="en-US" dirty="0" smtClean="0"/>
-          </a:p>
-          <a:p>
-            <a:pPr lvl="1"/>
-            <a:endParaRPr lang="en-US" dirty="0" smtClean="0"/>
-          </a:p>
-          <a:p>
-            <a:pPr lvl="1"/>
-            <a:endParaRPr lang="en-US" dirty="0" smtClean="0"/>
-          </a:p>
-        </p:txBody>
-      </p:sp>
-    </p:spTree>
-    <p:extLst>
-      <p:ext uri="{BB962C8B-B14F-4D97-AF65-F5344CB8AC3E}">
-        <p14:creationId xmlns:p14="http://schemas.microsoft.com/office/powerpoint/2010/main" val="386448841"/>
-      </p:ext>
-    </p:extLst>
-  </p:cSld>
-  <p:clrMapOvr>
-    <a:masterClrMapping/>
-  </p:clrMapOvr>
-  <p:timing>
-    <p:tnLst>
-      <p:par>
-        <p:cTn id="1" dur="indefinite" restart="never" nodeType="tmRoot"/>
-      </p:par>
-    </p:tnLst>
-  </p:timing>
-</p:sld>
-</file>
-
-<file path=ppt/slides/slide35.xml><?xml version="1.0" encoding="utf-8"?>
-<p:sld xmlns:a="http://schemas.openxmlformats.org/drawingml/2006/main" xmlns:r="http://schemas.openxmlformats.org/officeDocument/2006/relationships" xmlns:p="http://schemas.openxmlformats.org/presentationml/2006/main">
-  <p:cSld>
-    <p:spTree>
-      <p:nvGrpSpPr>
-        <p:cNvPr id="1" name=""/>
-        <p:cNvGrpSpPr/>
-        <p:nvPr/>
-      </p:nvGrpSpPr>
-      <p:grpSpPr>
-        <a:xfrm>
-          <a:off x="0" y="0"/>
-          <a:ext cx="0" cy="0"/>
-          <a:chOff x="0" y="0"/>
-          <a:chExt cx="0" cy="0"/>
-        </a:xfrm>
-      </p:grpSpPr>
-      <p:sp>
-        <p:nvSpPr>
-          <p:cNvPr id="2" name="Title 1"/>
-          <p:cNvSpPr>
-            <a:spLocks noGrp="1"/>
-          </p:cNvSpPr>
-          <p:nvPr>
-            <p:ph type="title"/>
-          </p:nvPr>
-        </p:nvSpPr>
-        <p:spPr/>
-        <p:txBody>
           <a:bodyPr/>
           <a:lstStyle/>
           <a:p>
@@ -8906,7 +8913,7 @@
 </p:sld>
 </file>
 
-<file path=ppt/slides/slide36.xml><?xml version="1.0" encoding="utf-8"?>
+<file path=ppt/slides/slide35.xml><?xml version="1.0" encoding="utf-8"?>
 <p:sld xmlns:a="http://schemas.openxmlformats.org/drawingml/2006/main" xmlns:r="http://schemas.openxmlformats.org/officeDocument/2006/relationships" xmlns:p="http://schemas.openxmlformats.org/presentationml/2006/main">
   <p:cSld>
     <p:spTree>
@@ -9014,7 +9021,7 @@
 </p:sld>
 </file>
 
-<file path=ppt/slides/slide37.xml><?xml version="1.0" encoding="utf-8"?>
+<file path=ppt/slides/slide36.xml><?xml version="1.0" encoding="utf-8"?>
 <p:sld xmlns:a="http://schemas.openxmlformats.org/drawingml/2006/main" xmlns:r="http://schemas.openxmlformats.org/officeDocument/2006/relationships" xmlns:p="http://schemas.openxmlformats.org/presentationml/2006/main">
   <p:cSld>
     <p:spTree>
@@ -9219,7 +9226,7 @@
 </p:sld>
 </file>
 
-<file path=ppt/slides/slide38.xml><?xml version="1.0" encoding="utf-8"?>
+<file path=ppt/slides/slide37.xml><?xml version="1.0" encoding="utf-8"?>
 <p:sld xmlns:a="http://schemas.openxmlformats.org/drawingml/2006/main" xmlns:r="http://schemas.openxmlformats.org/officeDocument/2006/relationships" xmlns:p="http://schemas.openxmlformats.org/presentationml/2006/main">
   <p:cSld>
     <p:spTree>
@@ -9389,7 +9396,7 @@
 </p:sld>
 </file>
 
-<file path=ppt/slides/slide39.xml><?xml version="1.0" encoding="utf-8"?>
+<file path=ppt/slides/slide38.xml><?xml version="1.0" encoding="utf-8"?>
 <p:sld xmlns:a="http://schemas.openxmlformats.org/drawingml/2006/main" xmlns:r="http://schemas.openxmlformats.org/officeDocument/2006/relationships" xmlns:p="http://schemas.openxmlformats.org/presentationml/2006/main">
   <p:cSld>
     <p:spTree>
@@ -9926,6 +9933,155 @@
 </p:sld>
 </file>
 
+<file path=ppt/slides/slide39.xml><?xml version="1.0" encoding="utf-8"?>
+<p:sld xmlns:a="http://schemas.openxmlformats.org/drawingml/2006/main" xmlns:r="http://schemas.openxmlformats.org/officeDocument/2006/relationships" xmlns:p="http://schemas.openxmlformats.org/presentationml/2006/main">
+  <p:cSld>
+    <p:spTree>
+      <p:nvGrpSpPr>
+        <p:cNvPr id="1" name=""/>
+        <p:cNvGrpSpPr/>
+        <p:nvPr/>
+      </p:nvGrpSpPr>
+      <p:grpSpPr>
+        <a:xfrm>
+          <a:off x="0" y="0"/>
+          <a:ext cx="0" cy="0"/>
+          <a:chOff x="0" y="0"/>
+          <a:chExt cx="0" cy="0"/>
+        </a:xfrm>
+      </p:grpSpPr>
+      <p:sp>
+        <p:nvSpPr>
+          <p:cNvPr id="2" name="Title 1"/>
+          <p:cNvSpPr>
+            <a:spLocks noGrp="1"/>
+          </p:cNvSpPr>
+          <p:nvPr>
+            <p:ph type="title"/>
+          </p:nvPr>
+        </p:nvSpPr>
+        <p:spPr/>
+        <p:txBody>
+          <a:bodyPr/>
+          <a:lstStyle/>
+          <a:p>
+            <a:r>
+              <a:rPr lang="en-US" dirty="0" smtClean="0"/>
+              <a:t>What’s next for YOU?</a:t>
+            </a:r>
+            <a:endParaRPr lang="en-US" dirty="0"/>
+          </a:p>
+        </p:txBody>
+      </p:sp>
+      <p:sp>
+        <p:nvSpPr>
+          <p:cNvPr id="3" name="Content Placeholder 2"/>
+          <p:cNvSpPr>
+            <a:spLocks noGrp="1"/>
+          </p:cNvSpPr>
+          <p:nvPr>
+            <p:ph idx="1"/>
+          </p:nvPr>
+        </p:nvSpPr>
+        <p:spPr>
+          <a:xfrm>
+            <a:off x="152400" y="1600200"/>
+            <a:ext cx="8763000" cy="5105400"/>
+          </a:xfrm>
+        </p:spPr>
+        <p:txBody>
+          <a:bodyPr>
+            <a:normAutofit lnSpcReduction="10000"/>
+          </a:bodyPr>
+          <a:lstStyle/>
+          <a:p>
+            <a:r>
+              <a:rPr lang="en-US" dirty="0" smtClean="0"/>
+              <a:t>Which of these is taught explicitly in the classroom?</a:t>
+            </a:r>
+          </a:p>
+          <a:p>
+            <a:pPr lvl="1"/>
+            <a:r>
+              <a:rPr lang="en-US" dirty="0" err="1" smtClean="0"/>
+              <a:t>Git</a:t>
+            </a:r>
+            <a:endParaRPr lang="en-US" dirty="0" smtClean="0"/>
+          </a:p>
+          <a:p>
+            <a:pPr lvl="1"/>
+            <a:r>
+              <a:rPr lang="en-US" dirty="0" smtClean="0"/>
+              <a:t>Databases</a:t>
+            </a:r>
+          </a:p>
+          <a:p>
+            <a:pPr lvl="1"/>
+            <a:r>
+              <a:rPr lang="en-US" dirty="0" smtClean="0"/>
+              <a:t>Machine learning</a:t>
+            </a:r>
+          </a:p>
+          <a:p>
+            <a:pPr lvl="1"/>
+            <a:r>
+              <a:rPr lang="en-US" dirty="0" smtClean="0"/>
+              <a:t>Packaging code</a:t>
+            </a:r>
+          </a:p>
+          <a:p>
+            <a:pPr lvl="1"/>
+            <a:r>
+              <a:rPr lang="en-US" dirty="0" smtClean="0"/>
+              <a:t>Soft skills</a:t>
+            </a:r>
+          </a:p>
+          <a:p>
+            <a:pPr lvl="1"/>
+            <a:r>
+              <a:rPr lang="en-US" dirty="0" smtClean="0"/>
+              <a:t>Communication</a:t>
+            </a:r>
+          </a:p>
+          <a:p>
+            <a:pPr lvl="1"/>
+            <a:r>
+              <a:rPr lang="en-US" dirty="0" smtClean="0"/>
+              <a:t>Project management</a:t>
+            </a:r>
+          </a:p>
+          <a:p>
+            <a:pPr lvl="1"/>
+            <a:r>
+              <a:rPr lang="en-US" dirty="0" smtClean="0"/>
+              <a:t>Self-motivation</a:t>
+            </a:r>
+          </a:p>
+          <a:p>
+            <a:endParaRPr lang="en-US" dirty="0"/>
+          </a:p>
+        </p:txBody>
+      </p:sp>
+    </p:spTree>
+    <p:extLst>
+      <p:ext uri="{BB962C8B-B14F-4D97-AF65-F5344CB8AC3E}">
+        <p14:creationId xmlns:p14="http://schemas.microsoft.com/office/powerpoint/2010/main" val="3093539082"/>
+      </p:ext>
+    </p:extLst>
+  </p:cSld>
+  <p:clrMapOvr>
+    <a:masterClrMapping/>
+  </p:clrMapOvr>
+  <p:timing>
+    <p:tnLst>
+      <p:par>
+        <p:cTn id="1" dur="indefinite" restart="never" nodeType="tmRoot"/>
+      </p:par>
+    </p:tnLst>
+  </p:timing>
+</p:sld>
+</file>
+
 <file path=ppt/slides/slide4.xml><?xml version="1.0" encoding="utf-8"?>
 <p:sld xmlns:a="http://schemas.openxmlformats.org/drawingml/2006/main" xmlns:r="http://schemas.openxmlformats.org/officeDocument/2006/relationships" xmlns:p="http://schemas.openxmlformats.org/presentationml/2006/main">
   <p:cSld>
@@ -10097,156 +10253,12 @@
             <p:ph type="title"/>
           </p:nvPr>
         </p:nvSpPr>
-        <p:spPr/>
-        <p:txBody>
-          <a:bodyPr/>
-          <a:lstStyle/>
-          <a:p>
-            <a:r>
-              <a:rPr lang="en-US" dirty="0" smtClean="0"/>
-              <a:t>What’s next for YOU?</a:t>
-            </a:r>
-            <a:endParaRPr lang="en-US" dirty="0"/>
-          </a:p>
-        </p:txBody>
-      </p:sp>
-      <p:sp>
-        <p:nvSpPr>
-          <p:cNvPr id="3" name="Content Placeholder 2"/>
-          <p:cNvSpPr>
-            <a:spLocks noGrp="1"/>
-          </p:cNvSpPr>
-          <p:nvPr>
-            <p:ph idx="1"/>
-          </p:nvPr>
-        </p:nvSpPr>
         <p:spPr>
           <a:xfrm>
-            <a:off x="152400" y="1600200"/>
-            <a:ext cx="8763000" cy="5105400"/>
+            <a:off x="457200" y="0"/>
+            <a:ext cx="8229600" cy="1143000"/>
           </a:xfrm>
         </p:spPr>
-        <p:txBody>
-          <a:bodyPr>
-            <a:normAutofit lnSpcReduction="10000"/>
-          </a:bodyPr>
-          <a:lstStyle/>
-          <a:p>
-            <a:r>
-              <a:rPr lang="en-US" dirty="0" smtClean="0"/>
-              <a:t>Which of these is taught explicitly in the classroom?</a:t>
-            </a:r>
-          </a:p>
-          <a:p>
-            <a:pPr lvl="1"/>
-            <a:r>
-              <a:rPr lang="en-US" dirty="0" err="1" smtClean="0"/>
-              <a:t>Git</a:t>
-            </a:r>
-            <a:endParaRPr lang="en-US" dirty="0" smtClean="0"/>
-          </a:p>
-          <a:p>
-            <a:pPr lvl="1"/>
-            <a:r>
-              <a:rPr lang="en-US" dirty="0" smtClean="0"/>
-              <a:t>Databases</a:t>
-            </a:r>
-          </a:p>
-          <a:p>
-            <a:pPr lvl="1"/>
-            <a:r>
-              <a:rPr lang="en-US" dirty="0" smtClean="0"/>
-              <a:t>Machine learning</a:t>
-            </a:r>
-          </a:p>
-          <a:p>
-            <a:pPr lvl="1"/>
-            <a:r>
-              <a:rPr lang="en-US" dirty="0" smtClean="0"/>
-              <a:t>Packaging code</a:t>
-            </a:r>
-          </a:p>
-          <a:p>
-            <a:pPr lvl="1"/>
-            <a:r>
-              <a:rPr lang="en-US" dirty="0" smtClean="0"/>
-              <a:t>Soft skills</a:t>
-            </a:r>
-          </a:p>
-          <a:p>
-            <a:pPr lvl="1"/>
-            <a:r>
-              <a:rPr lang="en-US" dirty="0" smtClean="0"/>
-              <a:t>Communication</a:t>
-            </a:r>
-          </a:p>
-          <a:p>
-            <a:pPr lvl="1"/>
-            <a:r>
-              <a:rPr lang="en-US" dirty="0" smtClean="0"/>
-              <a:t>Project management</a:t>
-            </a:r>
-          </a:p>
-          <a:p>
-            <a:pPr lvl="1"/>
-            <a:r>
-              <a:rPr lang="en-US" dirty="0" smtClean="0"/>
-              <a:t>Self-motivation</a:t>
-            </a:r>
-          </a:p>
-          <a:p>
-            <a:endParaRPr lang="en-US" dirty="0"/>
-          </a:p>
-        </p:txBody>
-      </p:sp>
-    </p:spTree>
-    <p:extLst>
-      <p:ext uri="{BB962C8B-B14F-4D97-AF65-F5344CB8AC3E}">
-        <p14:creationId xmlns:p14="http://schemas.microsoft.com/office/powerpoint/2010/main" val="3093539082"/>
-      </p:ext>
-    </p:extLst>
-  </p:cSld>
-  <p:clrMapOvr>
-    <a:masterClrMapping/>
-  </p:clrMapOvr>
-  <p:timing>
-    <p:tnLst>
-      <p:par>
-        <p:cTn id="1" dur="indefinite" restart="never" nodeType="tmRoot"/>
-      </p:par>
-    </p:tnLst>
-  </p:timing>
-</p:sld>
-</file>
-
-<file path=ppt/slides/slide41.xml><?xml version="1.0" encoding="utf-8"?>
-<p:sld xmlns:a="http://schemas.openxmlformats.org/drawingml/2006/main" xmlns:r="http://schemas.openxmlformats.org/officeDocument/2006/relationships" xmlns:p="http://schemas.openxmlformats.org/presentationml/2006/main">
-  <p:cSld>
-    <p:spTree>
-      <p:nvGrpSpPr>
-        <p:cNvPr id="1" name=""/>
-        <p:cNvGrpSpPr/>
-        <p:nvPr/>
-      </p:nvGrpSpPr>
-      <p:grpSpPr>
-        <a:xfrm>
-          <a:off x="0" y="0"/>
-          <a:ext cx="0" cy="0"/>
-          <a:chOff x="0" y="0"/>
-          <a:chExt cx="0" cy="0"/>
-        </a:xfrm>
-      </p:grpSpPr>
-      <p:sp>
-        <p:nvSpPr>
-          <p:cNvPr id="2" name="Title 1"/>
-          <p:cNvSpPr>
-            <a:spLocks noGrp="1"/>
-          </p:cNvSpPr>
-          <p:nvPr>
-            <p:ph type="title"/>
-          </p:nvPr>
-        </p:nvSpPr>
-        <p:spPr/>
         <p:txBody>
           <a:bodyPr>
             <a:normAutofit/>
@@ -10270,10 +10282,15 @@
             <p:ph idx="1"/>
           </p:nvPr>
         </p:nvSpPr>
-        <p:spPr/>
+        <p:spPr>
+          <a:xfrm>
+            <a:off x="0" y="762000"/>
+            <a:ext cx="9144000" cy="6096000"/>
+          </a:xfrm>
+        </p:spPr>
         <p:txBody>
           <a:bodyPr>
-            <a:normAutofit lnSpcReduction="10000"/>
+            <a:normAutofit fontScale="92500" lnSpcReduction="20000"/>
           </a:bodyPr>
           <a:lstStyle/>
           <a:p>
@@ -10330,7 +10347,7 @@
             <a:pPr lvl="3"/>
             <a:r>
               <a:rPr lang="en-US" dirty="0" err="1" smtClean="0"/>
-              <a:t>Rmarkdown</a:t>
+              <a:t>RMarkdown</a:t>
             </a:r>
             <a:endParaRPr lang="en-US" dirty="0"/>
           </a:p>
@@ -10380,8 +10397,77 @@
               <a:rPr lang="en-US" dirty="0" smtClean="0">
                 <a:sym typeface="Wingdings" panose="05000000000000000000" pitchFamily="2" charset="2"/>
               </a:rPr>
-              <a:t>Join ASA</a:t>
-            </a:r>
+              <a:t>Join ASA / ENAR / ISBA / </a:t>
+            </a:r>
+            <a:r>
+              <a:rPr lang="en-US" dirty="0" err="1" smtClean="0">
+                <a:sym typeface="Wingdings" panose="05000000000000000000" pitchFamily="2" charset="2"/>
+              </a:rPr>
+              <a:t>etc</a:t>
+            </a:r>
+            <a:endParaRPr lang="en-US" dirty="0" smtClean="0">
+              <a:sym typeface="Wingdings" panose="05000000000000000000" pitchFamily="2" charset="2"/>
+            </a:endParaRPr>
+          </a:p>
+          <a:p>
+            <a:pPr lvl="1"/>
+            <a:r>
+              <a:rPr lang="en-US" dirty="0" smtClean="0">
+                <a:sym typeface="Wingdings" panose="05000000000000000000" pitchFamily="2" charset="2"/>
+              </a:rPr>
+              <a:t>Update your materials!</a:t>
+            </a:r>
+          </a:p>
+          <a:p>
+            <a:pPr lvl="2"/>
+            <a:r>
+              <a:rPr lang="en-US" dirty="0" smtClean="0">
+                <a:sym typeface="Wingdings" panose="05000000000000000000" pitchFamily="2" charset="2"/>
+              </a:rPr>
+              <a:t>Spend 15 minutes this week at UNC UCS Drop-In Resume/CV</a:t>
+            </a:r>
+          </a:p>
+          <a:p>
+            <a:pPr lvl="2"/>
+            <a:r>
+              <a:rPr lang="en-US" dirty="0" smtClean="0">
+                <a:sym typeface="Wingdings" panose="05000000000000000000" pitchFamily="2" charset="2"/>
+              </a:rPr>
+              <a:t>Get your LinkedIn up to speed!!</a:t>
+            </a:r>
+          </a:p>
+          <a:p>
+            <a:pPr lvl="2"/>
+            <a:r>
+              <a:rPr lang="en-US" dirty="0" smtClean="0">
+                <a:sym typeface="Wingdings" panose="05000000000000000000" pitchFamily="2" charset="2"/>
+              </a:rPr>
+              <a:t>Consider starting personal webpage to control your online profile</a:t>
+            </a:r>
+          </a:p>
+          <a:p>
+            <a:pPr marL="914400" lvl="2" indent="0">
+              <a:buNone/>
+            </a:pPr>
+            <a:endParaRPr lang="en-US" dirty="0" smtClean="0">
+              <a:sym typeface="Wingdings" panose="05000000000000000000" pitchFamily="2" charset="2"/>
+            </a:endParaRPr>
+          </a:p>
+          <a:p>
+            <a:r>
+              <a:rPr lang="en-US" dirty="0" smtClean="0">
+                <a:sym typeface="Wingdings" panose="05000000000000000000" pitchFamily="2" charset="2"/>
+              </a:rPr>
+              <a:t>Thanks for your time! Go Heels!</a:t>
+            </a:r>
+            <a:endParaRPr lang="en-US" dirty="0">
+              <a:sym typeface="Wingdings" panose="05000000000000000000" pitchFamily="2" charset="2"/>
+            </a:endParaRPr>
+          </a:p>
+          <a:p>
+            <a:endParaRPr lang="en-US" dirty="0" smtClean="0">
+              <a:sym typeface="Wingdings" panose="05000000000000000000" pitchFamily="2" charset="2"/>
+            </a:endParaRPr>
           </a:p>
           <a:p>
             <a:pPr lvl="2"/>

</xml_diff>

<commit_message>
Added link for 2017 DSSG fellowshop
</commit_message>
<xml_diff>
--- a/BSA Internship Workshop 2016 Slides.pptx
+++ b/BSA Internship Workshop 2016 Slides.pptx
@@ -148,7 +148,7 @@
   </p:defaultTextStyle>
   <p:extLst>
     <p:ext uri="{EFAFB233-063F-42B5-8137-9DF3F51BA10A}">
-      <p15:sldGuideLst xmlns="" xmlns:p15="http://schemas.microsoft.com/office/powerpoint/2012/main">
+      <p15:sldGuideLst xmlns:p15="http://schemas.microsoft.com/office/powerpoint/2012/main" xmlns="">
         <p15:guide id="1" orient="horz" pos="2160">
           <p15:clr>
             <a:srgbClr val="A4A3A4"/>
@@ -247,7 +247,7 @@
           <a:p>
             <a:fld id="{54DCC961-02AC-4EB6-9DEE-5A6F9C91BDBE}" type="datetimeFigureOut">
               <a:rPr lang="en-US" smtClean="0"/>
-              <a:t>12/5/2016</a:t>
+              <a:t>12/7/2016</a:t>
             </a:fld>
             <a:endParaRPr lang="en-US"/>
           </a:p>
@@ -1060,7 +1060,7 @@
           <a:p>
             <a:fld id="{4DF9036F-4D36-4BF3-935E-38220818D494}" type="datetimeFigureOut">
               <a:rPr lang="en-US" smtClean="0"/>
-              <a:t>12/5/2016</a:t>
+              <a:t>12/7/2016</a:t>
             </a:fld>
             <a:endParaRPr lang="en-US"/>
           </a:p>
@@ -1230,7 +1230,7 @@
           <a:p>
             <a:fld id="{4DF9036F-4D36-4BF3-935E-38220818D494}" type="datetimeFigureOut">
               <a:rPr lang="en-US" smtClean="0"/>
-              <a:t>12/5/2016</a:t>
+              <a:t>12/7/2016</a:t>
             </a:fld>
             <a:endParaRPr lang="en-US"/>
           </a:p>
@@ -1410,7 +1410,7 @@
           <a:p>
             <a:fld id="{4DF9036F-4D36-4BF3-935E-38220818D494}" type="datetimeFigureOut">
               <a:rPr lang="en-US" smtClean="0"/>
-              <a:t>12/5/2016</a:t>
+              <a:t>12/7/2016</a:t>
             </a:fld>
             <a:endParaRPr lang="en-US"/>
           </a:p>
@@ -1580,7 +1580,7 @@
           <a:p>
             <a:fld id="{4DF9036F-4D36-4BF3-935E-38220818D494}" type="datetimeFigureOut">
               <a:rPr lang="en-US" smtClean="0"/>
-              <a:t>12/5/2016</a:t>
+              <a:t>12/7/2016</a:t>
             </a:fld>
             <a:endParaRPr lang="en-US"/>
           </a:p>
@@ -1826,7 +1826,7 @@
           <a:p>
             <a:fld id="{4DF9036F-4D36-4BF3-935E-38220818D494}" type="datetimeFigureOut">
               <a:rPr lang="en-US" smtClean="0"/>
-              <a:t>12/5/2016</a:t>
+              <a:t>12/7/2016</a:t>
             </a:fld>
             <a:endParaRPr lang="en-US"/>
           </a:p>
@@ -2114,7 +2114,7 @@
           <a:p>
             <a:fld id="{4DF9036F-4D36-4BF3-935E-38220818D494}" type="datetimeFigureOut">
               <a:rPr lang="en-US" smtClean="0"/>
-              <a:t>12/5/2016</a:t>
+              <a:t>12/7/2016</a:t>
             </a:fld>
             <a:endParaRPr lang="en-US"/>
           </a:p>
@@ -2536,7 +2536,7 @@
           <a:p>
             <a:fld id="{4DF9036F-4D36-4BF3-935E-38220818D494}" type="datetimeFigureOut">
               <a:rPr lang="en-US" smtClean="0"/>
-              <a:t>12/5/2016</a:t>
+              <a:t>12/7/2016</a:t>
             </a:fld>
             <a:endParaRPr lang="en-US"/>
           </a:p>
@@ -2654,7 +2654,7 @@
           <a:p>
             <a:fld id="{4DF9036F-4D36-4BF3-935E-38220818D494}" type="datetimeFigureOut">
               <a:rPr lang="en-US" smtClean="0"/>
-              <a:t>12/5/2016</a:t>
+              <a:t>12/7/2016</a:t>
             </a:fld>
             <a:endParaRPr lang="en-US"/>
           </a:p>
@@ -2749,7 +2749,7 @@
           <a:p>
             <a:fld id="{4DF9036F-4D36-4BF3-935E-38220818D494}" type="datetimeFigureOut">
               <a:rPr lang="en-US" smtClean="0"/>
-              <a:t>12/5/2016</a:t>
+              <a:t>12/7/2016</a:t>
             </a:fld>
             <a:endParaRPr lang="en-US"/>
           </a:p>
@@ -3026,7 +3026,7 @@
           <a:p>
             <a:fld id="{4DF9036F-4D36-4BF3-935E-38220818D494}" type="datetimeFigureOut">
               <a:rPr lang="en-US" smtClean="0"/>
-              <a:t>12/5/2016</a:t>
+              <a:t>12/7/2016</a:t>
             </a:fld>
             <a:endParaRPr lang="en-US"/>
           </a:p>
@@ -3279,7 +3279,7 @@
           <a:p>
             <a:fld id="{4DF9036F-4D36-4BF3-935E-38220818D494}" type="datetimeFigureOut">
               <a:rPr lang="en-US" smtClean="0"/>
-              <a:t>12/5/2016</a:t>
+              <a:t>12/7/2016</a:t>
             </a:fld>
             <a:endParaRPr lang="en-US"/>
           </a:p>
@@ -3526,7 +3526,7 @@
           <a:p>
             <a:fld id="{4DF9036F-4D36-4BF3-935E-38220818D494}" type="datetimeFigureOut">
               <a:rPr lang="en-US" smtClean="0"/>
-              <a:t>12/5/2016</a:t>
+              <a:t>12/7/2016</a:t>
             </a:fld>
             <a:endParaRPr lang="en-US"/>
           </a:p>
@@ -3965,15 +3965,7 @@
                   <a:schemeClr val="tx1"/>
                 </a:solidFill>
               </a:rPr>
-              <a:t>Brian Barkley, Yue </a:t>
-            </a:r>
-            <a:r>
-              <a:rPr lang="en-US" dirty="0" smtClean="0">
-                <a:solidFill>
-                  <a:schemeClr val="tx1"/>
-                </a:solidFill>
-              </a:rPr>
-              <a:t>Jiang</a:t>
+              <a:t>Brian Barkley, Yue Jiang</a:t>
             </a:r>
           </a:p>
           <a:p>
@@ -3994,7 +3986,6 @@
               <a:rPr lang="en-US" dirty="0" smtClean="0"/>
               <a:t> </a:t>
             </a:r>
-            <a:endParaRPr lang="en-US" dirty="0" smtClean="0"/>
           </a:p>
           <a:p>
             <a:endParaRPr lang="en-US" dirty="0"/>
@@ -5394,6 +5385,42 @@
               <a:rPr lang="en-US" sz="1600" dirty="0"/>
               <a:t> summer program to train aspiring data scientists to work on data mining, machine learning, big data, and data science projects with social impact. </a:t>
             </a:r>
+            <a:r>
+              <a:rPr lang="en-US" sz="1600" dirty="0"/>
+              <a:t> </a:t>
+            </a:r>
+            <a:r>
+              <a:rPr lang="en-US" sz="1600" smtClean="0"/>
+              <a:t>Apply here: </a:t>
+            </a:r>
+            <a:r>
+              <a:rPr lang="en-US" sz="1600" smtClean="0">
+                <a:hlinkClick r:id="rId5"/>
+              </a:rPr>
+              <a:t>https</a:t>
+            </a:r>
+            <a:r>
+              <a:rPr lang="en-US" sz="1600">
+                <a:hlinkClick r:id="rId5"/>
+              </a:rPr>
+              <a:t>://</a:t>
+            </a:r>
+            <a:r>
+              <a:rPr lang="en-US" sz="1600">
+                <a:hlinkClick r:id="rId5"/>
+              </a:rPr>
+              <a:t>dssg.uchicago.edu/faq-page</a:t>
+            </a:r>
+            <a:r>
+              <a:rPr lang="en-US" sz="1600" smtClean="0">
+                <a:hlinkClick r:id="rId5"/>
+              </a:rPr>
+              <a:t>/</a:t>
+            </a:r>
+            <a:r>
+              <a:rPr lang="en-US" sz="1600" smtClean="0"/>
+              <a:t> </a:t>
+            </a:r>
             <a:endParaRPr lang="en-US" sz="1600" dirty="0" smtClean="0"/>
           </a:p>
           <a:p>
@@ -5508,11 +5535,7 @@
           <a:p>
             <a:r>
               <a:rPr lang="en-US" dirty="0" smtClean="0"/>
-              <a:t>Requirements: internship vs </a:t>
-            </a:r>
-            <a:r>
-              <a:rPr lang="en-US" dirty="0" smtClean="0"/>
-              <a:t>job</a:t>
+              <a:t>Requirements: internship vs job</a:t>
             </a:r>
             <a:endParaRPr lang="en-US" dirty="0"/>
           </a:p>
@@ -5797,11 +5820,7 @@
           <a:p>
             <a:r>
               <a:rPr lang="en-US" dirty="0" smtClean="0"/>
-              <a:t>Requirements: internship vs </a:t>
-            </a:r>
-            <a:r>
-              <a:rPr lang="en-US" dirty="0" smtClean="0"/>
-              <a:t>job</a:t>
+              <a:t>Requirements: internship vs job</a:t>
             </a:r>
             <a:endParaRPr lang="en-US" dirty="0"/>
           </a:p>
@@ -6127,7 +6146,6 @@
               <a:rPr lang="en-US" dirty="0"/>
               <a:t>Requirements: internship vs job</a:t>
             </a:r>
-            <a:endParaRPr lang="en-US" dirty="0"/>
           </a:p>
         </p:txBody>
       </p:sp>
@@ -6188,7 +6206,6 @@
               <a:rPr lang="en-US" dirty="0" smtClean="0"/>
               <a:t>(they’re also long-term hiring strategies for companies)</a:t>
             </a:r>
-            <a:endParaRPr lang="en-US" dirty="0" smtClean="0"/>
           </a:p>
         </p:txBody>
       </p:sp>
@@ -6366,7 +6383,6 @@
               <a:rPr lang="en-US" dirty="0"/>
               <a:t>So are you prepared for an internship?</a:t>
             </a:r>
-            <a:endParaRPr lang="en-US" dirty="0"/>
           </a:p>
         </p:txBody>
       </p:sp>
@@ -6585,7 +6601,6 @@
               <a:rPr lang="en-US" dirty="0"/>
               <a:t>So are you prepared for an internship?</a:t>
             </a:r>
-            <a:endParaRPr lang="en-US" dirty="0"/>
           </a:p>
         </p:txBody>
       </p:sp>
@@ -6677,7 +6692,6 @@
               <a:rPr lang="en-US" dirty="0"/>
               <a:t>So are you prepared for an internship?</a:t>
             </a:r>
-            <a:endParaRPr lang="en-US" dirty="0"/>
           </a:p>
         </p:txBody>
       </p:sp>
@@ -6789,11 +6803,7 @@
             </a:r>
             <a:r>
               <a:rPr lang="en-US" dirty="0" smtClean="0"/>
-              <a:t>re </a:t>
-            </a:r>
-            <a:r>
-              <a:rPr lang="en-US" dirty="0" smtClean="0"/>
-              <a:t>you prepared for an internship?</a:t>
+              <a:t>re you prepared for an internship?</a:t>
             </a:r>
             <a:endParaRPr lang="en-US" dirty="0"/>
           </a:p>
@@ -6936,7 +6946,6 @@
               <a:rPr lang="en-US" dirty="0"/>
               <a:t>So are you prepared for an internship?</a:t>
             </a:r>
-            <a:endParaRPr lang="en-US" dirty="0"/>
           </a:p>
         </p:txBody>
       </p:sp>
@@ -8014,11 +8023,7 @@
           <a:p>
             <a:r>
               <a:rPr lang="en-US" dirty="0" smtClean="0"/>
-              <a:t>More </a:t>
-            </a:r>
-            <a:r>
-              <a:rPr lang="en-US" dirty="0" smtClean="0"/>
-              <a:t>help! - go to University Career Services!</a:t>
+              <a:t>More help! - go to University Career Services!</a:t>
             </a:r>
           </a:p>
           <a:p>
@@ -8563,7 +8568,6 @@
               <a:rPr lang="en-US" dirty="0" smtClean="0"/>
               <a:t>Did you mention any centers or research groups by name?</a:t>
             </a:r>
-            <a:endParaRPr lang="en-US" dirty="0" smtClean="0"/>
           </a:p>
           <a:p>
             <a:pPr lvl="3"/>
@@ -8683,11 +8687,7 @@
             <a:pPr lvl="1"/>
             <a:r>
               <a:rPr lang="en-US" dirty="0" smtClean="0"/>
-              <a:t>Knowing </a:t>
-            </a:r>
-            <a:r>
-              <a:rPr lang="en-US" dirty="0" smtClean="0"/>
-              <a:t>what you know now about UNC, what would you write about?</a:t>
+              <a:t>Knowing what you know now about UNC, what would you write about?</a:t>
             </a:r>
           </a:p>
           <a:p>

</xml_diff>